<commit_message>
Update research proposal ppt.pptx
</commit_message>
<xml_diff>
--- a/Notes and Primers/research proposal ppt.pptx
+++ b/Notes and Primers/research proposal ppt.pptx
@@ -988,7 +988,24 @@
           <a:bodyPr/>
           <a:lstStyle/>
           <a:p>
-            <a:endParaRPr lang="nl-NL" dirty="0"/>
+            <a:pPr marL="285750" indent="-285750">
+              <a:buClr>
+                <a:schemeClr val="accent2"/>
+              </a:buClr>
+              <a:buFont typeface="Arial" panose="020B0604020202020204" pitchFamily="34" charset="0"/>
+              <a:buChar char="•"/>
+            </a:pPr>
+            <a:endParaRPr lang="en-US" sz="1200" dirty="0"/>
+          </a:p>
+          <a:p>
+            <a:pPr marL="285750" indent="-285750">
+              <a:buClr>
+                <a:schemeClr val="accent2"/>
+              </a:buClr>
+              <a:buFont typeface="Arial" panose="020B0604020202020204" pitchFamily="34" charset="0"/>
+              <a:buChar char="•"/>
+            </a:pPr>
+            <a:endParaRPr lang="nl-NL" sz="1200" dirty="0"/>
           </a:p>
         </p:txBody>
       </p:sp>
@@ -5382,8 +5399,8 @@
         </p:nvSpPr>
         <p:spPr>
           <a:xfrm>
-            <a:off x="1000437" y="2042597"/>
-            <a:ext cx="4403188" cy="1323439"/>
+            <a:off x="1288850" y="1953172"/>
+            <a:ext cx="4403188" cy="707886"/>
           </a:xfrm>
           <a:prstGeom prst="rect">
             <a:avLst/>
@@ -5413,31 +5430,110 @@
               <a:buFont typeface="Arial" panose="020B0604020202020204" pitchFamily="34" charset="0"/>
               <a:buChar char="•"/>
             </a:pPr>
-            <a:r>
-              <a:rPr lang="en-US" sz="2000" dirty="0" err="1"/>
-              <a:t>blabla</a:t>
-            </a:r>
-            <a:endParaRPr lang="en-US" sz="2000" dirty="0"/>
-          </a:p>
+            <a:endParaRPr lang="nl-NL" sz="2000" dirty="0"/>
+          </a:p>
+        </p:txBody>
+      </p:sp>
+      <p:sp>
+        <p:nvSpPr>
+          <p:cNvPr id="11" name="TextBox 10">
+            <a:extLst>
+              <a:ext uri="{FF2B5EF4-FFF2-40B4-BE49-F238E27FC236}">
+                <a16:creationId xmlns:a16="http://schemas.microsoft.com/office/drawing/2014/main" id="{81E6AB93-45B9-46E2-B3B1-0A7167A7747C}"/>
+              </a:ext>
+            </a:extLst>
+          </p:cNvPr>
+          <p:cNvSpPr txBox="1"/>
+          <p:nvPr/>
+        </p:nvSpPr>
+        <p:spPr>
+          <a:xfrm>
+            <a:off x="1106658" y="2524320"/>
+            <a:ext cx="8189844" cy="3416320"/>
+          </a:xfrm>
+          <a:prstGeom prst="rect">
+            <a:avLst/>
+          </a:prstGeom>
+          <a:noFill/>
+        </p:spPr>
+        <p:txBody>
+          <a:bodyPr wrap="square" rtlCol="0">
+            <a:spAutoFit/>
+          </a:bodyPr>
+          <a:lstStyle/>
           <a:p>
             <a:pPr marL="285750" indent="-285750">
-              <a:buClr>
-                <a:schemeClr val="accent2"/>
-              </a:buClr>
               <a:buFont typeface="Arial" panose="020B0604020202020204" pitchFamily="34" charset="0"/>
               <a:buChar char="•"/>
             </a:pPr>
-            <a:endParaRPr lang="en-US" sz="2000" dirty="0"/>
+            <a:r>
+              <a:rPr lang="en-US" sz="2400" dirty="0"/>
+              <a:t>2-Dimensional EBM model</a:t>
+            </a:r>
           </a:p>
           <a:p>
             <a:pPr marL="285750" indent="-285750">
-              <a:buClr>
-                <a:schemeClr val="accent2"/>
-              </a:buClr>
               <a:buFont typeface="Arial" panose="020B0604020202020204" pitchFamily="34" charset="0"/>
               <a:buChar char="•"/>
             </a:pPr>
-            <a:endParaRPr lang="nl-NL" sz="2000" dirty="0"/>
+            <a:r>
+              <a:rPr lang="en-US" sz="2400" dirty="0"/>
+              <a:t>Proliferation and Remodeling</a:t>
+            </a:r>
+          </a:p>
+          <a:p>
+            <a:pPr marL="285750" indent="-285750">
+              <a:buFont typeface="Arial" panose="020B0604020202020204" pitchFamily="34" charset="0"/>
+              <a:buChar char="•"/>
+            </a:pPr>
+            <a:r>
+              <a:rPr lang="nl-NL" sz="2400" dirty="0"/>
+              <a:t>Modeling Angiogenesis, Contraction and Re-epithelialization</a:t>
+            </a:r>
+          </a:p>
+          <a:p>
+            <a:pPr marL="285750" indent="-285750">
+              <a:buFont typeface="Arial" panose="020B0604020202020204" pitchFamily="34" charset="0"/>
+              <a:buChar char="•"/>
+            </a:pPr>
+            <a:endParaRPr lang="en-US" sz="2400" dirty="0"/>
+          </a:p>
+          <a:p>
+            <a:pPr marL="285750" indent="-285750">
+              <a:buFont typeface="Arial" panose="020B0604020202020204" pitchFamily="34" charset="0"/>
+              <a:buChar char="•"/>
+            </a:pPr>
+            <a:r>
+              <a:rPr lang="en-US" sz="2400" dirty="0"/>
+              <a:t>Including changes in relevant cell populations (Endothelial cells, Macrophages, Fibroblasts, Myofibroblasts, Keratinocytes) and their key effector cytokines (TGF-</a:t>
+            </a:r>
+            <a:r>
+              <a:rPr lang="el-GR" sz="2400" dirty="0"/>
+              <a:t>α</a:t>
+            </a:r>
+            <a:r>
+              <a:rPr lang="en-US" sz="2400" dirty="0"/>
+              <a:t>, FGF-7, PDGF, </a:t>
+            </a:r>
+            <a:r>
+              <a:rPr lang="nl-NL" sz="2400" dirty="0"/>
+              <a:t>TGF-</a:t>
+            </a:r>
+            <a:r>
+              <a:rPr lang="el-GR" sz="2400" dirty="0"/>
+              <a:t>β</a:t>
+            </a:r>
+            <a:r>
+              <a:rPr lang="nl-NL" sz="2400" dirty="0"/>
+              <a:t>1, FGF(1,2,4), VEGF), and mechanical loads</a:t>
+            </a:r>
+          </a:p>
+          <a:p>
+            <a:pPr marL="285750" indent="-285750">
+              <a:buFont typeface="Arial" panose="020B0604020202020204" pitchFamily="34" charset="0"/>
+              <a:buChar char="•"/>
+            </a:pPr>
+            <a:endParaRPr lang="nl-NL" sz="2400" dirty="0"/>
           </a:p>
         </p:txBody>
       </p:sp>
@@ -7643,7 +7739,7 @@
             </a:pPr>
             <a:r>
               <a:rPr lang="nl-NL" sz="2800" dirty="0"/>
-              <a:t>Research proposal</a:t>
+              <a:t>Proposal</a:t>
             </a:r>
           </a:p>
           <a:p>
@@ -8191,15 +8287,7 @@
             </a:r>
             <a:r>
               <a:rPr lang="en-US" sz="2400" dirty="0"/>
-              <a:t>the loss of the skin appendages and re-</a:t>
-            </a:r>
-            <a:r>
-              <a:rPr lang="en-US" sz="2400" dirty="0" err="1"/>
-              <a:t>epithelialisation</a:t>
-            </a:r>
-            <a:r>
-              <a:rPr lang="en-US" sz="2400" dirty="0"/>
-              <a:t>, which can only occur from the edges </a:t>
+              <a:t>the loss of the skin appendages and re-epithelialization, which can only occur from the edges </a:t>
             </a:r>
             <a:r>
               <a:rPr lang="nl-NL" sz="2400" dirty="0"/>
@@ -8438,7 +8526,7 @@
         <p:spPr>
           <a:xfrm>
             <a:off x="2571750" y="2568382"/>
-            <a:ext cx="5182957" cy="923330"/>
+            <a:ext cx="6741654" cy="923330"/>
           </a:xfrm>
           <a:prstGeom prst="rect">
             <a:avLst/>
@@ -8457,7 +8545,7 @@
             </a:r>
             <a:r>
               <a:rPr lang="en-US" b="1" dirty="0"/>
-              <a:t>ABM</a:t>
+              <a:t>ABM/EBM</a:t>
             </a:r>
             <a:r>
               <a:rPr lang="en-US" dirty="0"/>
@@ -8475,11 +8563,11 @@
             </a:r>
             <a:r>
               <a:rPr lang="en-US" b="1" dirty="0"/>
-              <a:t>wound healing</a:t>
+              <a:t>wound healing </a:t>
             </a:r>
             <a:r>
               <a:rPr lang="en-US" dirty="0"/>
-              <a:t>. </a:t>
+              <a:t>(Inflammation, Proliferation, Remodeling) </a:t>
             </a:r>
           </a:p>
           <a:p>
@@ -10435,7 +10523,7 @@
         <p:spPr>
           <a:xfrm>
             <a:off x="947428" y="2229095"/>
-            <a:ext cx="4403188" cy="1323439"/>
+            <a:ext cx="4403188" cy="400110"/>
           </a:xfrm>
           <a:prstGeom prst="rect">
             <a:avLst/>
@@ -10447,40 +10535,6 @@
             <a:spAutoFit/>
           </a:bodyPr>
           <a:lstStyle/>
-          <a:p>
-            <a:pPr marL="285750" indent="-285750">
-              <a:buClr>
-                <a:schemeClr val="accent2"/>
-              </a:buClr>
-              <a:buFont typeface="Arial" panose="020B0604020202020204" pitchFamily="34" charset="0"/>
-              <a:buChar char="•"/>
-            </a:pPr>
-            <a:endParaRPr lang="en-US" sz="2000" dirty="0"/>
-          </a:p>
-          <a:p>
-            <a:pPr marL="285750" indent="-285750">
-              <a:buClr>
-                <a:schemeClr val="accent2"/>
-              </a:buClr>
-              <a:buFont typeface="Arial" panose="020B0604020202020204" pitchFamily="34" charset="0"/>
-              <a:buChar char="•"/>
-            </a:pPr>
-            <a:r>
-              <a:rPr lang="en-US" sz="2000" dirty="0" err="1"/>
-              <a:t>blabla</a:t>
-            </a:r>
-            <a:endParaRPr lang="en-US" sz="2000" dirty="0"/>
-          </a:p>
-          <a:p>
-            <a:pPr marL="285750" indent="-285750">
-              <a:buClr>
-                <a:schemeClr val="accent2"/>
-              </a:buClr>
-              <a:buFont typeface="Arial" panose="020B0604020202020204" pitchFamily="34" charset="0"/>
-              <a:buChar char="•"/>
-            </a:pPr>
-            <a:endParaRPr lang="en-US" sz="2000" dirty="0"/>
-          </a:p>
           <a:p>
             <a:pPr marL="285750" indent="-285750">
               <a:buClr>
@@ -10490,6 +10544,125 @@
               <a:buChar char="•"/>
             </a:pPr>
             <a:endParaRPr lang="nl-NL" sz="2000" dirty="0"/>
+          </a:p>
+        </p:txBody>
+      </p:sp>
+      <p:sp>
+        <p:nvSpPr>
+          <p:cNvPr id="3" name="TextBox 2">
+            <a:extLst>
+              <a:ext uri="{FF2B5EF4-FFF2-40B4-BE49-F238E27FC236}">
+                <a16:creationId xmlns:a16="http://schemas.microsoft.com/office/drawing/2014/main" id="{693DFEA6-4E59-45AE-A4DA-36932E0C7895}"/>
+              </a:ext>
+            </a:extLst>
+          </p:cNvPr>
+          <p:cNvSpPr txBox="1"/>
+          <p:nvPr/>
+        </p:nvSpPr>
+        <p:spPr>
+          <a:xfrm>
+            <a:off x="1106658" y="2524320"/>
+            <a:ext cx="8189844" cy="2677656"/>
+          </a:xfrm>
+          <a:prstGeom prst="rect">
+            <a:avLst/>
+          </a:prstGeom>
+          <a:noFill/>
+        </p:spPr>
+        <p:txBody>
+          <a:bodyPr wrap="square" rtlCol="0">
+            <a:spAutoFit/>
+          </a:bodyPr>
+          <a:lstStyle/>
+          <a:p>
+            <a:pPr marL="285750" indent="-285750">
+              <a:buClr>
+                <a:schemeClr val="accent2"/>
+              </a:buClr>
+              <a:buFont typeface="Arial" panose="020B0604020202020204" pitchFamily="34" charset="0"/>
+              <a:buChar char="•"/>
+            </a:pPr>
+            <a:r>
+              <a:rPr lang="en-US" sz="2400" dirty="0"/>
+              <a:t>SPARK-PL (Java)</a:t>
+            </a:r>
+          </a:p>
+          <a:p>
+            <a:pPr marL="285750" indent="-285750">
+              <a:buClr>
+                <a:schemeClr val="accent2"/>
+              </a:buClr>
+              <a:buFont typeface="Arial" panose="020B0604020202020204" pitchFamily="34" charset="0"/>
+              <a:buChar char="•"/>
+            </a:pPr>
+            <a:r>
+              <a:rPr lang="en-US" sz="2400" dirty="0"/>
+              <a:t>2-Dimensional ABM model</a:t>
+            </a:r>
+          </a:p>
+          <a:p>
+            <a:pPr marL="285750" indent="-285750">
+              <a:buClr>
+                <a:schemeClr val="accent2"/>
+              </a:buClr>
+              <a:buFont typeface="Arial" panose="020B0604020202020204" pitchFamily="34" charset="0"/>
+              <a:buChar char="•"/>
+            </a:pPr>
+            <a:r>
+              <a:rPr lang="en-US" sz="2400" dirty="0"/>
+              <a:t>Inflammation</a:t>
+            </a:r>
+          </a:p>
+          <a:p>
+            <a:pPr marL="285750" indent="-285750">
+              <a:buClr>
+                <a:schemeClr val="accent2"/>
+              </a:buClr>
+              <a:buFont typeface="Arial" panose="020B0604020202020204" pitchFamily="34" charset="0"/>
+              <a:buChar char="•"/>
+            </a:pPr>
+            <a:endParaRPr lang="en-US" sz="2400" dirty="0"/>
+          </a:p>
+          <a:p>
+            <a:pPr marL="285750" indent="-285750">
+              <a:buClr>
+                <a:schemeClr val="accent2"/>
+              </a:buClr>
+              <a:buFont typeface="Arial" panose="020B0604020202020204" pitchFamily="34" charset="0"/>
+              <a:buChar char="•"/>
+            </a:pPr>
+            <a:r>
+              <a:rPr lang="en-US" sz="2400" dirty="0"/>
+              <a:t>Including changes in relevant cell populations (Endothelial cells, Macrophages, Neutrophils, and Fibroblasts) and their key effector cytokines (TNF-</a:t>
+            </a:r>
+            <a:r>
+              <a:rPr lang="el-GR" sz="2400" dirty="0"/>
+              <a:t>α</a:t>
+            </a:r>
+            <a:r>
+              <a:rPr lang="en-US" sz="2400" dirty="0"/>
+              <a:t>, IL-1</a:t>
+            </a:r>
+            <a:r>
+              <a:rPr lang="el-GR" sz="2400" dirty="0"/>
+              <a:t>β</a:t>
+            </a:r>
+            <a:r>
+              <a:rPr lang="en-US" sz="2400" dirty="0"/>
+              <a:t>, IL-10,</a:t>
+            </a:r>
+            <a:r>
+              <a:rPr lang="nl-NL" sz="2400" dirty="0"/>
+              <a:t>and TGF-</a:t>
+            </a:r>
+            <a:r>
+              <a:rPr lang="el-GR" sz="2400" dirty="0"/>
+              <a:t>β</a:t>
+            </a:r>
+            <a:r>
+              <a:rPr lang="nl-NL" sz="2400" dirty="0"/>
+              <a:t>1)</a:t>
+            </a:r>
           </a:p>
         </p:txBody>
       </p:sp>
@@ -10626,10 +10799,10 @@
       </p:cxnSp>
       <p:sp>
         <p:nvSpPr>
-          <p:cNvPr id="5" name="TextBox 4">
+          <p:cNvPr id="6" name="TextBox 5">
             <a:extLst>
               <a:ext uri="{FF2B5EF4-FFF2-40B4-BE49-F238E27FC236}">
-                <a16:creationId xmlns:a16="http://schemas.microsoft.com/office/drawing/2014/main" id="{A3CE2097-9055-46D4-BB9D-6469006A15C5}"/>
+                <a16:creationId xmlns:a16="http://schemas.microsoft.com/office/drawing/2014/main" id="{AD60452D-E0FB-45A5-BF31-D426D360A20A}"/>
               </a:ext>
             </a:extLst>
           </p:cNvPr>
@@ -10638,8 +10811,8 @@
         </p:nvSpPr>
         <p:spPr>
           <a:xfrm>
-            <a:off x="1338405" y="2525464"/>
-            <a:ext cx="4403188" cy="1323439"/>
+            <a:off x="1159667" y="2462490"/>
+            <a:ext cx="8189844" cy="2677656"/>
           </a:xfrm>
           <a:prstGeom prst="rect">
             <a:avLst/>
@@ -10659,7 +10832,11 @@
               <a:buFont typeface="Arial" panose="020B0604020202020204" pitchFamily="34" charset="0"/>
               <a:buChar char="•"/>
             </a:pPr>
-            <a:endParaRPr lang="en-US" sz="2000" dirty="0"/>
+            <a:r>
+              <a:rPr lang="en-US" sz="2400" dirty="0" err="1"/>
+              <a:t>Matlab</a:t>
+            </a:r>
+            <a:endParaRPr lang="en-US" sz="2400" dirty="0"/>
           </a:p>
           <a:p>
             <a:pPr marL="285750" indent="-285750">
@@ -10670,10 +10847,9 @@
               <a:buChar char="•"/>
             </a:pPr>
             <a:r>
-              <a:rPr lang="en-US" sz="2000" dirty="0" err="1"/>
-              <a:t>blabla</a:t>
-            </a:r>
-            <a:endParaRPr lang="en-US" sz="2000" dirty="0"/>
+              <a:rPr lang="en-US" sz="2400" dirty="0"/>
+              <a:t>3-Dimensional ABM model</a:t>
+            </a:r>
           </a:p>
           <a:p>
             <a:pPr marL="285750" indent="-285750">
@@ -10683,7 +10859,10 @@
               <a:buFont typeface="Arial" panose="020B0604020202020204" pitchFamily="34" charset="0"/>
               <a:buChar char="•"/>
             </a:pPr>
-            <a:endParaRPr lang="en-US" sz="2000" dirty="0"/>
+            <a:r>
+              <a:rPr lang="en-US" sz="2400" dirty="0"/>
+              <a:t>Contraction</a:t>
+            </a:r>
           </a:p>
           <a:p>
             <a:pPr marL="285750" indent="-285750">
@@ -10693,7 +10872,40 @@
               <a:buFont typeface="Arial" panose="020B0604020202020204" pitchFamily="34" charset="0"/>
               <a:buChar char="•"/>
             </a:pPr>
-            <a:endParaRPr lang="nl-NL" sz="2000" dirty="0"/>
+            <a:endParaRPr lang="en-US" sz="2400" dirty="0"/>
+          </a:p>
+          <a:p>
+            <a:pPr marL="285750" indent="-285750">
+              <a:buClr>
+                <a:schemeClr val="accent2"/>
+              </a:buClr>
+              <a:buFont typeface="Arial" panose="020B0604020202020204" pitchFamily="34" charset="0"/>
+              <a:buChar char="•"/>
+            </a:pPr>
+            <a:r>
+              <a:rPr lang="en-US" sz="2400" dirty="0"/>
+              <a:t>Including changes in relevant cell populations (</a:t>
+            </a:r>
+            <a:r>
+              <a:rPr lang="nl-NL" sz="2400" dirty="0"/>
+              <a:t>leukocytes, fibroblasts, and collagen </a:t>
+            </a:r>
+            <a:r>
+              <a:rPr lang="en-US" sz="2400" dirty="0"/>
+              <a:t>) and their key effector cytokines (</a:t>
+            </a:r>
+            <a:r>
+              <a:rPr lang="en-US" sz="2400" dirty="0" err="1"/>
+              <a:t>tPA</a:t>
+            </a:r>
+            <a:r>
+              <a:rPr lang="en-US" sz="2400" dirty="0"/>
+              <a:t>, PDGF, TGFB</a:t>
+            </a:r>
+            <a:r>
+              <a:rPr lang="nl-NL" sz="2400" dirty="0"/>
+              <a:t>)</a:t>
+            </a:r>
           </a:p>
         </p:txBody>
       </p:sp>

</xml_diff>